<commit_message>
fix de formato pptx
</commit_message>
<xml_diff>
--- a/djangoISSSTE/static/ppt/Ficha_Tecnica_Avance.pptx
+++ b/djangoISSSTE/static/ppt/Ficha_Tecnica_Avance.pptx
@@ -107,7 +107,7 @@
   </p:defaultTextStyle>
   <p:extLst>
     <p:ext uri="{EFAFB233-063F-42B5-8137-9DF3F51BA10A}">
-      <p15:sldGuideLst xmlns="" xmlns:p15="http://schemas.microsoft.com/office/powerpoint/2012/main"/>
+      <p15:sldGuideLst xmlns:p15="http://schemas.microsoft.com/office/powerpoint/2012/main" xmlns=""/>
     </p:ext>
   </p:extLst>
 </p:presentation>
@@ -3966,7 +3966,7 @@
           <p:nvPr>
             <p:extLst>
               <p:ext uri="{D42A27DB-BD31-4B8C-83A1-F6EECF244321}">
-                <p14:modId xmlns:p14="http://schemas.microsoft.com/office/powerpoint/2010/main" val="3157161627"/>
+                <p14:modId xmlns:p14="http://schemas.microsoft.com/office/powerpoint/2010/main" val="698736616"/>
               </p:ext>
             </p:extLst>
           </p:nvPr>
@@ -3982,8 +3982,8 @@
                 <a:tableStyleId>{5C22544A-7EE6-4342-B048-85BDC9FD1C3A}</a:tableStyleId>
               </a:tblPr>
               <a:tblGrid>
-                <a:gridCol w="1678597"/>
-                <a:gridCol w="4480465"/>
+                <a:gridCol w="1418809"/>
+                <a:gridCol w="4740253"/>
               </a:tblGrid>
               <a:tr h="229006">
                 <a:tc>
@@ -8609,7 +8609,7 @@
           <p:nvPr>
             <p:extLst>
               <p:ext uri="{D42A27DB-BD31-4B8C-83A1-F6EECF244321}">
-                <p14:modId xmlns:p14="http://schemas.microsoft.com/office/powerpoint/2010/main" val="3064768067"/>
+                <p14:modId xmlns:p14="http://schemas.microsoft.com/office/powerpoint/2010/main" val="788746643"/>
               </p:ext>
             </p:extLst>
           </p:nvPr>
@@ -8625,8 +8625,8 @@
                 <a:tableStyleId>{5C22544A-7EE6-4342-B048-85BDC9FD1C3A}</a:tableStyleId>
               </a:tblPr>
               <a:tblGrid>
-                <a:gridCol w="1678597"/>
-                <a:gridCol w="4480465"/>
+                <a:gridCol w="1418809"/>
+                <a:gridCol w="4740253"/>
               </a:tblGrid>
               <a:tr h="229006">
                 <a:tc>
@@ -12717,7 +12717,7 @@
         </p:nvSpPr>
         <p:spPr>
           <a:xfrm>
-            <a:off x="10400765" y="676910"/>
+            <a:off x="10382359" y="695315"/>
             <a:ext cx="1969912" cy="307777"/>
           </a:xfrm>
           <a:prstGeom prst="rect">
@@ -13126,7 +13126,7 @@
   <a:extraClrSchemeLst/>
   <a:extLst>
     <a:ext uri="{05A4C25C-085E-4340-85A3-A5531E510DB2}">
-      <thm15:themeFamily xmlns="" xmlns:thm15="http://schemas.microsoft.com/office/thememl/2012/main" name="Office Theme" id="{62F939B6-93AF-4DB8-9C6B-D6C7DFDC589F}" vid="{4A3C46E8-61CC-4603-A589-7422A47A8E4A}"/>
+      <thm15:themeFamily xmlns:thm15="http://schemas.microsoft.com/office/thememl/2012/main" xmlns="" name="Office Theme" id="{62F939B6-93AF-4DB8-9C6B-D6C7DFDC589F}" vid="{4A3C46E8-61CC-4603-A589-7422A47A8E4A}"/>
     </a:ext>
   </a:extLst>
 </a:theme>

</xml_diff>